<commit_message>
Last state of everything
</commit_message>
<xml_diff>
--- a/Presentation.pptx
+++ b/Presentation.pptx
@@ -343,7 +343,7 @@
           <a:p>
             <a:fld id="{2290C234-C58F-9040-B091-8E74998275A2}" type="datetimeFigureOut">
               <a:rPr lang="en-US" smtClean="0"/>
-              <a:t>5/14/24</a:t>
+              <a:t>5/17/24</a:t>
             </a:fld>
             <a:endParaRPr lang="en-US"/>
           </a:p>
@@ -677,7 +677,7 @@
           <a:p>
             <a:fld id="{2290C234-C58F-9040-B091-8E74998275A2}" type="datetimeFigureOut">
               <a:rPr lang="en-US" smtClean="0"/>
-              <a:t>5/14/24</a:t>
+              <a:t>5/17/24</a:t>
             </a:fld>
             <a:endParaRPr lang="en-US"/>
           </a:p>
@@ -955,7 +955,7 @@
           <a:p>
             <a:fld id="{2290C234-C58F-9040-B091-8E74998275A2}" type="datetimeFigureOut">
               <a:rPr lang="en-US" smtClean="0"/>
-              <a:t>5/14/24</a:t>
+              <a:t>5/17/24</a:t>
             </a:fld>
             <a:endParaRPr lang="en-US"/>
           </a:p>
@@ -1523,7 +1523,7 @@
           <a:p>
             <a:fld id="{2290C234-C58F-9040-B091-8E74998275A2}" type="datetimeFigureOut">
               <a:rPr lang="en-US" smtClean="0"/>
-              <a:t>5/14/24</a:t>
+              <a:t>5/17/24</a:t>
             </a:fld>
             <a:endParaRPr lang="en-US"/>
           </a:p>
@@ -1801,7 +1801,7 @@
           <a:p>
             <a:fld id="{2290C234-C58F-9040-B091-8E74998275A2}" type="datetimeFigureOut">
               <a:rPr lang="en-US" smtClean="0"/>
-              <a:t>5/14/24</a:t>
+              <a:t>5/17/24</a:t>
             </a:fld>
             <a:endParaRPr lang="en-US"/>
           </a:p>
@@ -2363,7 +2363,7 @@
           <a:p>
             <a:fld id="{2290C234-C58F-9040-B091-8E74998275A2}" type="datetimeFigureOut">
               <a:rPr lang="en-US" smtClean="0"/>
-              <a:t>5/14/24</a:t>
+              <a:t>5/17/24</a:t>
             </a:fld>
             <a:endParaRPr lang="en-US"/>
           </a:p>
@@ -2690,7 +2690,7 @@
           <a:p>
             <a:fld id="{2290C234-C58F-9040-B091-8E74998275A2}" type="datetimeFigureOut">
               <a:rPr lang="en-US" smtClean="0"/>
-              <a:t>5/14/24</a:t>
+              <a:t>5/17/24</a:t>
             </a:fld>
             <a:endParaRPr lang="en-US"/>
           </a:p>
@@ -2895,7 +2895,7 @@
           <a:p>
             <a:fld id="{2290C234-C58F-9040-B091-8E74998275A2}" type="datetimeFigureOut">
               <a:rPr lang="en-US" smtClean="0"/>
-              <a:t>5/14/24</a:t>
+              <a:t>5/17/24</a:t>
             </a:fld>
             <a:endParaRPr lang="en-US"/>
           </a:p>
@@ -3105,7 +3105,7 @@
           <a:p>
             <a:fld id="{2290C234-C58F-9040-B091-8E74998275A2}" type="datetimeFigureOut">
               <a:rPr lang="en-US" smtClean="0"/>
-              <a:t>5/14/24</a:t>
+              <a:t>5/17/24</a:t>
             </a:fld>
             <a:endParaRPr lang="en-US"/>
           </a:p>
@@ -3305,7 +3305,7 @@
           <a:p>
             <a:fld id="{2290C234-C58F-9040-B091-8E74998275A2}" type="datetimeFigureOut">
               <a:rPr lang="en-US" smtClean="0"/>
-              <a:t>5/14/24</a:t>
+              <a:t>5/17/24</a:t>
             </a:fld>
             <a:endParaRPr lang="en-US"/>
           </a:p>
@@ -3581,7 +3581,7 @@
           <a:p>
             <a:fld id="{2290C234-C58F-9040-B091-8E74998275A2}" type="datetimeFigureOut">
               <a:rPr lang="en-US" smtClean="0"/>
-              <a:t>5/14/24</a:t>
+              <a:t>5/17/24</a:t>
             </a:fld>
             <a:endParaRPr lang="en-US"/>
           </a:p>
@@ -3847,7 +3847,7 @@
           <a:p>
             <a:fld id="{2290C234-C58F-9040-B091-8E74998275A2}" type="datetimeFigureOut">
               <a:rPr lang="en-US" smtClean="0"/>
-              <a:t>5/14/24</a:t>
+              <a:t>5/17/24</a:t>
             </a:fld>
             <a:endParaRPr lang="en-US"/>
           </a:p>
@@ -4221,7 +4221,7 @@
           <a:p>
             <a:fld id="{2290C234-C58F-9040-B091-8E74998275A2}" type="datetimeFigureOut">
               <a:rPr lang="en-US" smtClean="0"/>
-              <a:t>5/14/24</a:t>
+              <a:t>5/17/24</a:t>
             </a:fld>
             <a:endParaRPr lang="en-US"/>
           </a:p>
@@ -4369,7 +4369,7 @@
           <a:p>
             <a:fld id="{2290C234-C58F-9040-B091-8E74998275A2}" type="datetimeFigureOut">
               <a:rPr lang="en-US" smtClean="0"/>
-              <a:t>5/14/24</a:t>
+              <a:t>5/17/24</a:t>
             </a:fld>
             <a:endParaRPr lang="en-US"/>
           </a:p>
@@ -4494,7 +4494,7 @@
           <a:p>
             <a:fld id="{2290C234-C58F-9040-B091-8E74998275A2}" type="datetimeFigureOut">
               <a:rPr lang="en-US" smtClean="0"/>
-              <a:t>5/14/24</a:t>
+              <a:t>5/17/24</a:t>
             </a:fld>
             <a:endParaRPr lang="en-US"/>
           </a:p>
@@ -4779,7 +4779,7 @@
           <a:p>
             <a:fld id="{2290C234-C58F-9040-B091-8E74998275A2}" type="datetimeFigureOut">
               <a:rPr lang="en-US" smtClean="0"/>
-              <a:t>5/14/24</a:t>
+              <a:t>5/17/24</a:t>
             </a:fld>
             <a:endParaRPr lang="en-US"/>
           </a:p>
@@ -5103,7 +5103,7 @@
           <a:p>
             <a:fld id="{2290C234-C58F-9040-B091-8E74998275A2}" type="datetimeFigureOut">
               <a:rPr lang="en-US" smtClean="0"/>
-              <a:t>5/14/24</a:t>
+              <a:t>5/17/24</a:t>
             </a:fld>
             <a:endParaRPr lang="en-US"/>
           </a:p>
@@ -5317,7 +5317,7 @@
           <a:p>
             <a:fld id="{2290C234-C58F-9040-B091-8E74998275A2}" type="datetimeFigureOut">
               <a:rPr lang="en-US" smtClean="0"/>
-              <a:t>5/14/24</a:t>
+              <a:t>5/17/24</a:t>
             </a:fld>
             <a:endParaRPr lang="en-US"/>
           </a:p>
@@ -6215,13 +6215,10 @@
               </a:lnSpc>
             </a:pPr>
             <a:r>
-              <a:rPr lang="en-US" sz="1800" dirty="0" err="1"/>
-              <a:t>Isar</a:t>
-            </a:r>
-            <a:r>
               <a:rPr lang="en-US" sz="1800" dirty="0"/>
-              <a:t> (“intelligible semi-automated reasoning”) proof language</a:t>
-            </a:r>
+              <a:t>Generic meta-logic – FOL, HOL, ZFC all possible</a:t>
+            </a:r>
+            <a:endParaRPr lang="en-US" dirty="0"/>
           </a:p>
           <a:p>
             <a:pPr>
@@ -6230,17 +6227,6 @@
               </a:lnSpc>
             </a:pPr>
             <a:r>
-              <a:rPr lang="en-US" sz="1800" dirty="0"/>
-              <a:t>HOL – High Order Language</a:t>
-            </a:r>
-          </a:p>
-          <a:p>
-            <a:pPr>
-              <a:lnSpc>
-                <a:spcPct val="90000"/>
-              </a:lnSpc>
-            </a:pPr>
-            <a:r>
               <a:rPr lang="en-US" dirty="0"/>
               <a:t>Tactic Language</a:t>
             </a:r>
@@ -6451,6 +6437,14 @@
                 <a:latin typeface="LMMonoSlant10"/>
               </a:rPr>
               <a:t>Definition before use</a:t>
+            </a:r>
+          </a:p>
+          <a:p>
+            <a:r>
+              <a:rPr lang="en-US" dirty="0">
+                <a:latin typeface="LMMonoSlant10"/>
+              </a:rPr>
+              <a:t>Quotations around terms</a:t>
             </a:r>
             <a:endParaRPr lang="en-US" dirty="0"/>
           </a:p>

</xml_diff>